<commit_message>
Material for Conference updated
</commit_message>
<xml_diff>
--- a/GeoPython_2018.pptx
+++ b/GeoPython_2018.pptx
@@ -5367,15 +5367,12 @@
               <a:rPr lang="en-IN" sz="2400" dirty="0">
                 <a:hlinkClick r:id="rId4"/>
               </a:rPr>
-              <a:t>https://github.com/greatdevaks/GeoPython</a:t>
-            </a:r>
-            <a:r>
-              <a:rPr lang="en-IN" sz="2400">
-                <a:hlinkClick r:id="rId4"/>
-              </a:rPr>
-              <a:t>_2018</a:t>
-            </a:r>
-            <a:endParaRPr lang="en-IN" sz="2400" dirty="0"/>
+              <a:t>https://github.com/greatdevaks/GeoPython_Basel_2018</a:t>
+            </a:r>
+            <a:r>
+              <a:rPr lang="en-IN" sz="2400" dirty="0"/>
+              <a:t> </a:t>
+            </a:r>
           </a:p>
         </p:txBody>
       </p:sp>

</xml_diff>